<commit_message>
Updated presentation for lab 01
</commit_message>
<xml_diff>
--- a/Lecture/PV239-Xamarin-Lecture.pptx
+++ b/Lecture/PV239-Xamarin-Lecture.pptx
@@ -60,7 +60,7 @@
     <p:sldId id="325" r:id="rId51"/>
     <p:sldId id="281" r:id="rId52"/>
   </p:sldIdLst>
-  <p:sldSz cx="9144000" cy="6858000" type="screen4x3"/>
+  <p:sldSz cx="12192000" cy="6858000"/>
   <p:notesSz cx="6858000" cy="9144000"/>
   <p:defaultTextStyle>
     <a:defPPr>
@@ -160,12 +160,12 @@
   <p:extLst>
     <p:ext uri="{EFAFB233-063F-42B5-8137-9DF3F51BA10A}">
       <p15:sldGuideLst xmlns:p15="http://schemas.microsoft.com/office/powerpoint/2012/main">
-        <p15:guide id="1" orient="horz" pos="2160">
+        <p15:guide id="1" orient="horz" pos="2160" userDrawn="1">
           <p15:clr>
             <a:srgbClr val="A4A3A4"/>
           </p15:clr>
         </p15:guide>
-        <p15:guide id="2" pos="2880">
+        <p15:guide id="2" pos="3840" userDrawn="1">
           <p15:clr>
             <a:srgbClr val="A4A3A4"/>
           </p15:clr>
@@ -189,12 +189,6 @@
 
 <file path=ppt/changesInfos/changesInfo1.xml><?xml version="1.0" encoding="utf-8"?>
 <pc:chgInfo xmlns:a="http://schemas.openxmlformats.org/drawingml/2006/main" xmlns:r="http://schemas.openxmlformats.org/officeDocument/2006/relationships" xmlns:ac="http://schemas.microsoft.com/office/drawing/2013/main/command" xmlns:pc="http://schemas.microsoft.com/office/powerpoint/2013/main/command">
-  <pc:docChgLst>
-    <pc:chgData name="Roman Jašek" userId="8c5da18282d529bf" providerId="LiveId" clId="{5BF68723-011B-462B-9D79-08C34F789597}"/>
-  </pc:docChgLst>
-  <pc:docChgLst>
-    <pc:chgData name="Roman Jašek" userId="8c5da18282d529bf" providerId="LiveId" clId="{C6973BBB-233E-44CD-8B86-02692856A2D3}"/>
-  </pc:docChgLst>
   <pc:docChgLst>
     <pc:chgData name="Roman Jašek" userId="8c5da18282d529bf" providerId="LiveId" clId="{3213034D-875C-4F22-A8D3-D717EBC2622E}"/>
     <pc:docChg chg="undo redo custSel addSld delSld modSld sldOrd">
@@ -1234,7 +1228,7 @@
           <a:p>
             <a:fld id="{769D9D34-EBDF-444B-8E61-3132A89E4FC2}" type="datetimeFigureOut">
               <a:rPr lang="cs-CZ" smtClean="0"/>
-              <a:t>12.01.2020</a:t>
+              <a:t>12.02.2022</a:t>
             </a:fld>
             <a:endParaRPr lang="cs-CZ"/>
           </a:p>
@@ -1252,8 +1246,8 @@
         </p:nvSpPr>
         <p:spPr>
           <a:xfrm>
-            <a:off x="1371600" y="1143000"/>
-            <a:ext cx="4114800" cy="3086100"/>
+            <a:off x="685800" y="1143000"/>
+            <a:ext cx="5486400" cy="3086100"/>
           </a:xfrm>
           <a:prstGeom prst="rect">
             <a:avLst/>
@@ -1529,7 +1523,12 @@
             <p:ph type="sldImg"/>
           </p:nvPr>
         </p:nvSpPr>
-        <p:spPr/>
+        <p:spPr>
+          <a:xfrm>
+            <a:off x="685800" y="1143000"/>
+            <a:ext cx="5486400" cy="3086100"/>
+          </a:xfrm>
+        </p:spPr>
       </p:sp>
       <p:sp>
         <p:nvSpPr>
@@ -1613,7 +1612,12 @@
             <p:ph type="sldImg"/>
           </p:nvPr>
         </p:nvSpPr>
-        <p:spPr/>
+        <p:spPr>
+          <a:xfrm>
+            <a:off x="685800" y="1143000"/>
+            <a:ext cx="5486400" cy="3086100"/>
+          </a:xfrm>
+        </p:spPr>
       </p:sp>
       <p:sp>
         <p:nvSpPr>
@@ -1713,7 +1717,12 @@
             <p:ph type="sldImg"/>
           </p:nvPr>
         </p:nvSpPr>
-        <p:spPr/>
+        <p:spPr>
+          <a:xfrm>
+            <a:off x="685800" y="1143000"/>
+            <a:ext cx="5486400" cy="3086100"/>
+          </a:xfrm>
+        </p:spPr>
       </p:sp>
       <p:sp>
         <p:nvSpPr>
@@ -1865,8 +1874,8 @@
         </p:nvSpPr>
         <p:spPr>
           <a:xfrm>
-            <a:off x="585829" y="1132705"/>
-            <a:ext cx="8075240" cy="1440161"/>
+            <a:off x="781105" y="1132706"/>
+            <a:ext cx="10766987" cy="1440161"/>
           </a:xfrm>
         </p:spPr>
         <p:txBody>
@@ -1905,8 +1914,8 @@
         </p:blipFill>
         <p:spPr>
           <a:xfrm>
-            <a:off x="-36512" y="4434319"/>
-            <a:ext cx="9180512" cy="2423681"/>
+            <a:off x="-48683" y="4434320"/>
+            <a:ext cx="12240683" cy="2423681"/>
           </a:xfrm>
           <a:prstGeom prst="rect">
             <a:avLst/>
@@ -1922,7 +1931,7 @@
         <p:spPr>
           <a:xfrm>
             <a:off x="0" y="0"/>
-            <a:ext cx="9144000" cy="510268"/>
+            <a:ext cx="12192000" cy="510268"/>
           </a:xfrm>
           <a:prstGeom prst="rect">
             <a:avLst/>
@@ -1991,8 +2000,8 @@
         </p:blipFill>
         <p:spPr>
           <a:xfrm>
-            <a:off x="200025" y="0"/>
-            <a:ext cx="1536779" cy="1276416"/>
+            <a:off x="266701" y="0"/>
+            <a:ext cx="2049039" cy="1276416"/>
           </a:xfrm>
           <a:prstGeom prst="rect">
             <a:avLst/>
@@ -2011,8 +2020,8 @@
         </p:nvSpPr>
         <p:spPr>
           <a:xfrm>
-            <a:off x="943211" y="2852936"/>
-            <a:ext cx="7257578" cy="2016125"/>
+            <a:off x="1257615" y="2852937"/>
+            <a:ext cx="9676771" cy="2016125"/>
           </a:xfrm>
         </p:spPr>
         <p:txBody>
@@ -2178,7 +2187,7 @@
           <a:p>
             <a:fld id="{E7B4EAE2-05D7-4CED-BE1F-5C52B46909EC}" type="datetimeFigureOut">
               <a:rPr lang="cs-CZ" smtClean="0"/>
-              <a:t>12.01.2020</a:t>
+              <a:t>12.02.2022</a:t>
             </a:fld>
             <a:endParaRPr lang="cs-CZ"/>
           </a:p>
@@ -2280,8 +2289,8 @@
         </p:nvSpPr>
         <p:spPr>
           <a:xfrm>
-            <a:off x="6629400" y="274639"/>
-            <a:ext cx="2057400" cy="5851525"/>
+            <a:off x="8839200" y="274640"/>
+            <a:ext cx="2743200" cy="5851525"/>
           </a:xfrm>
         </p:spPr>
         <p:txBody>
@@ -2308,8 +2317,8 @@
         </p:nvSpPr>
         <p:spPr>
           <a:xfrm>
-            <a:off x="457200" y="274639"/>
-            <a:ext cx="6019800" cy="5851525"/>
+            <a:off x="609600" y="274640"/>
+            <a:ext cx="8026400" cy="5851525"/>
           </a:xfrm>
         </p:spPr>
         <p:txBody>
@@ -2370,7 +2379,7 @@
           <a:p>
             <a:fld id="{E7B4EAE2-05D7-4CED-BE1F-5C52B46909EC}" type="datetimeFigureOut">
               <a:rPr lang="cs-CZ" smtClean="0"/>
-              <a:t>12.01.2020</a:t>
+              <a:t>12.02.2022</a:t>
             </a:fld>
             <a:endParaRPr lang="cs-CZ"/>
           </a:p>
@@ -2478,7 +2487,7 @@
             <a:fld id="{E7B4EAE2-05D7-4CED-BE1F-5C52B46909EC}" type="datetimeFigureOut">
               <a:rPr lang="cs-CZ" smtClean="0"/>
               <a:pPr/>
-              <a:t>12.01.2020</a:t>
+              <a:t>12.02.2022</a:t>
             </a:fld>
             <a:endParaRPr lang="cs-CZ"/>
           </a:p>
@@ -2535,8 +2544,8 @@
         </p:nvSpPr>
         <p:spPr>
           <a:xfrm>
-            <a:off x="5815" y="2794047"/>
-            <a:ext cx="4566184" cy="1074524"/>
+            <a:off x="7754" y="2794047"/>
+            <a:ext cx="6088245" cy="1074524"/>
           </a:xfrm>
           <a:prstGeom prst="round2DiagRect">
             <a:avLst/>
@@ -2569,7 +2578,7 @@
           <a:lstStyle/>
           <a:p>
             <a:pPr algn="just"/>
-            <a:endParaRPr lang="cs-CZ" dirty="0"/>
+            <a:endParaRPr lang="cs-CZ" sz="1800" dirty="0"/>
           </a:p>
         </p:txBody>
       </p:sp>
@@ -2581,8 +2590,8 @@
         </p:nvSpPr>
         <p:spPr>
           <a:xfrm>
-            <a:off x="13184" y="3986306"/>
-            <a:ext cx="4558815" cy="1185261"/>
+            <a:off x="17579" y="3986307"/>
+            <a:ext cx="6078420" cy="1185261"/>
           </a:xfrm>
           <a:prstGeom prst="round2DiagRect">
             <a:avLst/>
@@ -2615,7 +2624,7 @@
           <a:lstStyle/>
           <a:p>
             <a:pPr algn="just"/>
-            <a:endParaRPr lang="cs-CZ" dirty="0"/>
+            <a:endParaRPr lang="cs-CZ" sz="1800" dirty="0"/>
           </a:p>
         </p:txBody>
       </p:sp>
@@ -2627,8 +2636,8 @@
         </p:nvSpPr>
         <p:spPr>
           <a:xfrm>
-            <a:off x="5815" y="1601786"/>
-            <a:ext cx="4566190" cy="1074525"/>
+            <a:off x="7754" y="1601787"/>
+            <a:ext cx="6088253" cy="1074525"/>
           </a:xfrm>
           <a:prstGeom prst="round2DiagRect">
             <a:avLst/>
@@ -2661,7 +2670,7 @@
           <a:lstStyle/>
           <a:p>
             <a:pPr algn="just"/>
-            <a:endParaRPr lang="cs-CZ" dirty="0"/>
+            <a:endParaRPr lang="cs-CZ" sz="1800" dirty="0"/>
           </a:p>
         </p:txBody>
       </p:sp>
@@ -2677,8 +2686,8 @@
         </p:nvSpPr>
         <p:spPr>
           <a:xfrm>
-            <a:off x="457199" y="260648"/>
-            <a:ext cx="8229600" cy="1143000"/>
+            <a:off x="609599" y="260648"/>
+            <a:ext cx="10972800" cy="1143000"/>
           </a:xfrm>
         </p:spPr>
         <p:txBody>
@@ -2727,8 +2736,8 @@
         </p:blipFill>
         <p:spPr>
           <a:xfrm>
-            <a:off x="5012602" y="1601786"/>
-            <a:ext cx="3765933" cy="3516191"/>
+            <a:off x="6683470" y="1601787"/>
+            <a:ext cx="5021244" cy="3516191"/>
           </a:xfrm>
           <a:prstGeom prst="rect">
             <a:avLst/>
@@ -2743,8 +2752,8 @@
         </p:nvSpPr>
         <p:spPr>
           <a:xfrm>
-            <a:off x="190635" y="1668905"/>
-            <a:ext cx="4176464" cy="1323439"/>
+            <a:off x="254180" y="1668906"/>
+            <a:ext cx="5568619" cy="1015663"/>
           </a:xfrm>
           <a:prstGeom prst="rect">
             <a:avLst/>
@@ -2802,8 +2811,8 @@
         </p:nvSpPr>
         <p:spPr>
           <a:xfrm>
-            <a:off x="192697" y="2944160"/>
-            <a:ext cx="4104456" cy="707886"/>
+            <a:off x="256929" y="2944160"/>
+            <a:ext cx="5472608" cy="707886"/>
           </a:xfrm>
           <a:prstGeom prst="rect">
             <a:avLst/>
@@ -2845,8 +2854,8 @@
         </p:nvSpPr>
         <p:spPr>
           <a:xfrm>
-            <a:off x="2191612" y="2971196"/>
-            <a:ext cx="3168352" cy="1015663"/>
+            <a:off x="2922150" y="2971196"/>
+            <a:ext cx="4224469" cy="1015663"/>
           </a:xfrm>
           <a:prstGeom prst="rect">
             <a:avLst/>
@@ -2895,8 +2904,8 @@
         </p:nvSpPr>
         <p:spPr>
           <a:xfrm>
-            <a:off x="190635" y="4155905"/>
-            <a:ext cx="4644516" cy="1015663"/>
+            <a:off x="254180" y="4155906"/>
+            <a:ext cx="6192688" cy="1015663"/>
           </a:xfrm>
           <a:prstGeom prst="rect">
             <a:avLst/>
@@ -3031,8 +3040,8 @@
         </p:nvSpPr>
         <p:spPr>
           <a:xfrm>
-            <a:off x="201931" y="1189176"/>
-            <a:ext cx="4033911" cy="2188933"/>
+            <a:off x="269242" y="1189177"/>
+            <a:ext cx="5378548" cy="1781578"/>
           </a:xfrm>
         </p:spPr>
         <p:txBody>
@@ -3132,8 +3141,8 @@
         </p:nvSpPr>
         <p:spPr>
           <a:xfrm>
-            <a:off x="4908161" y="1189176"/>
-            <a:ext cx="4033911" cy="2188933"/>
+            <a:off x="6544215" y="1189177"/>
+            <a:ext cx="5378548" cy="1781578"/>
           </a:xfrm>
         </p:spPr>
         <p:txBody>
@@ -3386,8 +3395,8 @@
         </p:nvSpPr>
         <p:spPr>
           <a:xfrm>
-            <a:off x="381000" y="1411552"/>
-            <a:ext cx="8382000" cy="2210862"/>
+            <a:off x="508000" y="1411552"/>
+            <a:ext cx="11176000" cy="2210862"/>
           </a:xfrm>
         </p:spPr>
         <p:txBody>
@@ -3591,7 +3600,7 @@
           <a:p>
             <a:fld id="{E7B4EAE2-05D7-4CED-BE1F-5C52B46909EC}" type="datetimeFigureOut">
               <a:rPr lang="cs-CZ" smtClean="0"/>
-              <a:t>12.01.2020</a:t>
+              <a:t>12.02.2022</a:t>
             </a:fld>
             <a:endParaRPr lang="cs-CZ"/>
           </a:p>
@@ -3693,8 +3702,8 @@
         </p:nvSpPr>
         <p:spPr>
           <a:xfrm>
-            <a:off x="457200" y="274639"/>
-            <a:ext cx="8229600" cy="850105"/>
+            <a:off x="609600" y="274640"/>
+            <a:ext cx="10972800" cy="850105"/>
           </a:xfrm>
         </p:spPr>
         <p:txBody>
@@ -3729,8 +3738,8 @@
         </p:nvSpPr>
         <p:spPr>
           <a:xfrm>
-            <a:off x="457200" y="1268761"/>
-            <a:ext cx="8229600" cy="4857404"/>
+            <a:off x="609600" y="1268761"/>
+            <a:ext cx="10972800" cy="4857404"/>
           </a:xfrm>
         </p:spPr>
         <p:txBody>
@@ -3844,7 +3853,7 @@
           <a:p>
             <a:fld id="{E7B4EAE2-05D7-4CED-BE1F-5C52B46909EC}" type="datetimeFigureOut">
               <a:rPr lang="cs-CZ" smtClean="0"/>
-              <a:t>12.01.2020</a:t>
+              <a:t>12.02.2022</a:t>
             </a:fld>
             <a:endParaRPr lang="cs-CZ"/>
           </a:p>
@@ -3969,8 +3978,8 @@
         </p:nvSpPr>
         <p:spPr>
           <a:xfrm>
-            <a:off x="457200" y="1600201"/>
-            <a:ext cx="4038600" cy="4525963"/>
+            <a:off x="609600" y="1600202"/>
+            <a:ext cx="5384800" cy="4525963"/>
           </a:xfrm>
         </p:spPr>
         <p:txBody>
@@ -4054,8 +4063,8 @@
         </p:nvSpPr>
         <p:spPr>
           <a:xfrm>
-            <a:off x="4648200" y="1600201"/>
-            <a:ext cx="4038600" cy="4525963"/>
+            <a:off x="6197600" y="1600202"/>
+            <a:ext cx="5384800" cy="4525963"/>
           </a:xfrm>
         </p:spPr>
         <p:txBody>
@@ -4144,7 +4153,7 @@
           <a:p>
             <a:fld id="{E7B4EAE2-05D7-4CED-BE1F-5C52B46909EC}" type="datetimeFigureOut">
               <a:rPr lang="cs-CZ" smtClean="0"/>
-              <a:t>12.01.2020</a:t>
+              <a:t>12.02.2022</a:t>
             </a:fld>
             <a:endParaRPr lang="cs-CZ"/>
           </a:p>
@@ -4273,8 +4282,8 @@
         </p:nvSpPr>
         <p:spPr>
           <a:xfrm>
-            <a:off x="457200" y="1535113"/>
-            <a:ext cx="4040188" cy="639763"/>
+            <a:off x="609600" y="1535114"/>
+            <a:ext cx="5386917" cy="639763"/>
           </a:xfrm>
         </p:spPr>
         <p:txBody>
@@ -4338,8 +4347,8 @@
         </p:nvSpPr>
         <p:spPr>
           <a:xfrm>
-            <a:off x="457200" y="2174875"/>
-            <a:ext cx="4040188" cy="3951288"/>
+            <a:off x="609600" y="2174875"/>
+            <a:ext cx="5386917" cy="3951288"/>
           </a:xfrm>
         </p:spPr>
         <p:txBody>
@@ -4423,8 +4432,8 @@
         </p:nvSpPr>
         <p:spPr>
           <a:xfrm>
-            <a:off x="4645027" y="1535113"/>
-            <a:ext cx="4041775" cy="639763"/>
+            <a:off x="6193370" y="1535114"/>
+            <a:ext cx="5389033" cy="639763"/>
           </a:xfrm>
         </p:spPr>
         <p:txBody>
@@ -4488,8 +4497,8 @@
         </p:nvSpPr>
         <p:spPr>
           <a:xfrm>
-            <a:off x="4645027" y="2174875"/>
-            <a:ext cx="4041775" cy="3951288"/>
+            <a:off x="6193370" y="2174875"/>
+            <a:ext cx="5389033" cy="3951288"/>
           </a:xfrm>
         </p:spPr>
         <p:txBody>
@@ -4578,7 +4587,7 @@
           <a:p>
             <a:fld id="{E7B4EAE2-05D7-4CED-BE1F-5C52B46909EC}" type="datetimeFigureOut">
               <a:rPr lang="cs-CZ" smtClean="0"/>
-              <a:t>12.01.2020</a:t>
+              <a:t>12.02.2022</a:t>
             </a:fld>
             <a:endParaRPr lang="cs-CZ"/>
           </a:p>
@@ -4708,7 +4717,7 @@
           <a:p>
             <a:fld id="{E7B4EAE2-05D7-4CED-BE1F-5C52B46909EC}" type="datetimeFigureOut">
               <a:rPr lang="cs-CZ" smtClean="0"/>
-              <a:t>12.01.2020</a:t>
+              <a:t>12.02.2022</a:t>
             </a:fld>
             <a:endParaRPr lang="cs-CZ"/>
           </a:p>
@@ -4815,7 +4824,7 @@
           <a:p>
             <a:fld id="{E7B4EAE2-05D7-4CED-BE1F-5C52B46909EC}" type="datetimeFigureOut">
               <a:rPr lang="cs-CZ" smtClean="0"/>
-              <a:t>12.01.2020</a:t>
+              <a:t>12.02.2022</a:t>
             </a:fld>
             <a:endParaRPr lang="cs-CZ"/>
           </a:p>
@@ -4917,8 +4926,8 @@
         </p:nvSpPr>
         <p:spPr>
           <a:xfrm>
-            <a:off x="457202" y="273049"/>
-            <a:ext cx="3008313" cy="1162051"/>
+            <a:off x="609603" y="273050"/>
+            <a:ext cx="4011084" cy="1162051"/>
           </a:xfrm>
         </p:spPr>
         <p:txBody>
@@ -4949,8 +4958,8 @@
         </p:nvSpPr>
         <p:spPr>
           <a:xfrm>
-            <a:off x="3575050" y="273052"/>
-            <a:ext cx="5111750" cy="5853113"/>
+            <a:off x="4766733" y="273053"/>
+            <a:ext cx="6815667" cy="5853113"/>
           </a:xfrm>
         </p:spPr>
         <p:txBody>
@@ -5034,8 +5043,8 @@
         </p:nvSpPr>
         <p:spPr>
           <a:xfrm>
-            <a:off x="457202" y="1435102"/>
-            <a:ext cx="3008313" cy="4691063"/>
+            <a:off x="609603" y="1435103"/>
+            <a:ext cx="4011084" cy="4691063"/>
           </a:xfrm>
         </p:spPr>
         <p:txBody>
@@ -5104,7 +5113,7 @@
           <a:p>
             <a:fld id="{E7B4EAE2-05D7-4CED-BE1F-5C52B46909EC}" type="datetimeFigureOut">
               <a:rPr lang="cs-CZ" smtClean="0"/>
-              <a:t>12.01.2020</a:t>
+              <a:t>12.02.2022</a:t>
             </a:fld>
             <a:endParaRPr lang="cs-CZ"/>
           </a:p>
@@ -5206,8 +5215,8 @@
         </p:nvSpPr>
         <p:spPr>
           <a:xfrm>
-            <a:off x="1792288" y="4800600"/>
-            <a:ext cx="5486400" cy="566739"/>
+            <a:off x="2389717" y="4800601"/>
+            <a:ext cx="7315200" cy="566739"/>
           </a:xfrm>
         </p:spPr>
         <p:txBody>
@@ -5238,8 +5247,8 @@
         </p:nvSpPr>
         <p:spPr>
           <a:xfrm>
-            <a:off x="1792288" y="612775"/>
-            <a:ext cx="5486400" cy="4114800"/>
+            <a:off x="2389717" y="612775"/>
+            <a:ext cx="7315200" cy="4114800"/>
           </a:xfrm>
         </p:spPr>
         <p:txBody>
@@ -5303,8 +5312,8 @@
         </p:nvSpPr>
         <p:spPr>
           <a:xfrm>
-            <a:off x="1792288" y="5367338"/>
-            <a:ext cx="5486400" cy="804863"/>
+            <a:off x="2389717" y="5367339"/>
+            <a:ext cx="7315200" cy="804863"/>
           </a:xfrm>
         </p:spPr>
         <p:txBody>
@@ -5373,7 +5382,7 @@
           <a:p>
             <a:fld id="{E7B4EAE2-05D7-4CED-BE1F-5C52B46909EC}" type="datetimeFigureOut">
               <a:rPr lang="cs-CZ" smtClean="0"/>
-              <a:t>12.01.2020</a:t>
+              <a:t>12.02.2022</a:t>
             </a:fld>
             <a:endParaRPr lang="cs-CZ"/>
           </a:p>
@@ -5483,8 +5492,8 @@
         </p:nvSpPr>
         <p:spPr>
           <a:xfrm>
-            <a:off x="457200" y="274639"/>
-            <a:ext cx="8229600" cy="1143000"/>
+            <a:off x="609600" y="274639"/>
+            <a:ext cx="10972800" cy="1143000"/>
           </a:xfrm>
           <a:prstGeom prst="rect">
             <a:avLst/>
@@ -5515,8 +5524,8 @@
         </p:nvSpPr>
         <p:spPr>
           <a:xfrm>
-            <a:off x="457200" y="1600201"/>
-            <a:ext cx="8229600" cy="4525963"/>
+            <a:off x="609600" y="1600202"/>
+            <a:ext cx="10972800" cy="4525963"/>
           </a:xfrm>
           <a:prstGeom prst="rect">
             <a:avLst/>
@@ -5576,8 +5585,8 @@
         </p:nvSpPr>
         <p:spPr>
           <a:xfrm>
-            <a:off x="457200" y="6356351"/>
-            <a:ext cx="2133600" cy="365125"/>
+            <a:off x="609600" y="6356352"/>
+            <a:ext cx="2844800" cy="365125"/>
           </a:xfrm>
           <a:prstGeom prst="rect">
             <a:avLst/>
@@ -5602,7 +5611,7 @@
             <a:fld id="{E7B4EAE2-05D7-4CED-BE1F-5C52B46909EC}" type="datetimeFigureOut">
               <a:rPr lang="cs-CZ" smtClean="0"/>
               <a:pPr/>
-              <a:t>12.01.2020</a:t>
+              <a:t>12.02.2022</a:t>
             </a:fld>
             <a:endParaRPr lang="cs-CZ"/>
           </a:p>
@@ -5623,8 +5632,8 @@
         </p:blipFill>
         <p:spPr>
           <a:xfrm>
-            <a:off x="323528" y="6021411"/>
-            <a:ext cx="8820472" cy="863973"/>
+            <a:off x="431371" y="6021412"/>
+            <a:ext cx="11760629" cy="863973"/>
           </a:xfrm>
           <a:prstGeom prst="rect">
             <a:avLst/>
@@ -5643,8 +5652,8 @@
         </p:nvSpPr>
         <p:spPr>
           <a:xfrm>
-            <a:off x="3124200" y="6356351"/>
-            <a:ext cx="2895600" cy="365125"/>
+            <a:off x="4165600" y="6356352"/>
+            <a:ext cx="3860800" cy="365125"/>
           </a:xfrm>
           <a:prstGeom prst="rect">
             <a:avLst/>
@@ -5682,8 +5691,8 @@
         </p:nvSpPr>
         <p:spPr>
           <a:xfrm>
-            <a:off x="6553200" y="6356351"/>
-            <a:ext cx="2133600" cy="365125"/>
+            <a:off x="8737600" y="6356352"/>
+            <a:ext cx="2844800" cy="365125"/>
           </a:xfrm>
           <a:prstGeom prst="rect">
             <a:avLst/>
@@ -5723,7 +5732,7 @@
         <p:grpSpPr>
           <a:xfrm>
             <a:off x="0" y="6363968"/>
-            <a:ext cx="9144000" cy="510268"/>
+            <a:ext cx="12192000" cy="510268"/>
             <a:chOff x="0" y="0"/>
             <a:chExt cx="9144000" cy="510268"/>
           </a:xfrm>
@@ -6276,7 +6285,7 @@
         </p:nvSpPr>
         <p:spPr>
           <a:xfrm>
-            <a:off x="381000" y="1411552"/>
+            <a:off x="1905000" y="1411552"/>
             <a:ext cx="8382000" cy="3933384"/>
           </a:xfrm>
         </p:spPr>
@@ -7204,7 +7213,7 @@
         </p:nvSpPr>
         <p:spPr>
           <a:xfrm>
-            <a:off x="381000" y="1411552"/>
+            <a:off x="1905000" y="1411553"/>
             <a:ext cx="8382000" cy="2954655"/>
           </a:xfrm>
         </p:spPr>
@@ -7301,7 +7310,7 @@
         </p:nvSpPr>
         <p:spPr>
           <a:xfrm>
-            <a:off x="251520" y="4376027"/>
+            <a:off x="1775520" y="4376028"/>
             <a:ext cx="8640960" cy="1763047"/>
           </a:xfrm>
           <a:prstGeom prst="rect">
@@ -7332,9 +7341,6 @@
               <a:lnSpc>
                 <a:spcPct val="107000"/>
               </a:lnSpc>
-              <a:spcAft>
-                <a:spcPts val="0"/>
-              </a:spcAft>
               <a:tabLst>
                 <a:tab pos="581660" algn="l"/>
                 <a:tab pos="1163320" algn="l"/>
@@ -7530,9 +7536,6 @@
               <a:lnSpc>
                 <a:spcPct val="107000"/>
               </a:lnSpc>
-              <a:spcAft>
-                <a:spcPts val="0"/>
-              </a:spcAft>
               <a:tabLst>
                 <a:tab pos="581660" algn="l"/>
                 <a:tab pos="1163320" algn="l"/>
@@ -7684,9 +7687,6 @@
               <a:lnSpc>
                 <a:spcPct val="107000"/>
               </a:lnSpc>
-              <a:spcAft>
-                <a:spcPts val="0"/>
-              </a:spcAft>
               <a:tabLst>
                 <a:tab pos="581660" algn="l"/>
                 <a:tab pos="1163320" algn="l"/>
@@ -7838,9 +7838,6 @@
               <a:lnSpc>
                 <a:spcPct val="107000"/>
               </a:lnSpc>
-              <a:spcAft>
-                <a:spcPts val="0"/>
-              </a:spcAft>
               <a:tabLst>
                 <a:tab pos="581660" algn="l"/>
                 <a:tab pos="1163320" algn="l"/>
@@ -8036,9 +8033,6 @@
               <a:lnSpc>
                 <a:spcPct val="107000"/>
               </a:lnSpc>
-              <a:spcAft>
-                <a:spcPts val="0"/>
-              </a:spcAft>
               <a:tabLst>
                 <a:tab pos="581660" algn="l"/>
                 <a:tab pos="1163320" algn="l"/>
@@ -8114,12 +8108,6 @@
               </a:rPr>
               <a:t> </a:t>
             </a:r>
-            <a:endParaRPr lang="cs-CZ" sz="1200" dirty="0">
-              <a:effectLst/>
-              <a:latin typeface="Calibri" panose="020F0502020204030204" pitchFamily="34" charset="0"/>
-              <a:ea typeface="Times New Roman" panose="02020603050405020304" pitchFamily="18" charset="0"/>
-              <a:cs typeface="Times New Roman" panose="02020603050405020304" pitchFamily="18" charset="0"/>
-            </a:endParaRPr>
           </a:p>
         </p:txBody>
       </p:sp>
@@ -8540,7 +8528,7 @@
         </p:blipFill>
         <p:spPr>
           <a:xfrm>
-            <a:off x="2392458" y="3241519"/>
+            <a:off x="3916459" y="3241519"/>
             <a:ext cx="1215835" cy="2553254"/>
           </a:xfrm>
           <a:prstGeom prst="rect">
@@ -8570,7 +8558,7 @@
         </p:blipFill>
         <p:spPr>
           <a:xfrm>
-            <a:off x="5505311" y="3266901"/>
+            <a:off x="7029311" y="3266901"/>
             <a:ext cx="1276628" cy="2553254"/>
           </a:xfrm>
           <a:prstGeom prst="rect">
@@ -8889,7 +8877,7 @@
         </p:blipFill>
         <p:spPr>
           <a:xfrm>
-            <a:off x="2362062" y="3335039"/>
+            <a:off x="3886063" y="3335039"/>
             <a:ext cx="1276627" cy="2553252"/>
           </a:xfrm>
           <a:prstGeom prst="rect">
@@ -8919,7 +8907,7 @@
         </p:blipFill>
         <p:spPr>
           <a:xfrm>
-            <a:off x="5497713" y="3326220"/>
+            <a:off x="7021713" y="3326220"/>
             <a:ext cx="1291824" cy="2553252"/>
           </a:xfrm>
           <a:prstGeom prst="rect">
@@ -9233,7 +9221,7 @@
         </p:blipFill>
         <p:spPr>
           <a:xfrm>
-            <a:off x="2390359" y="3207856"/>
+            <a:off x="3914360" y="3207857"/>
             <a:ext cx="1220033" cy="2562071"/>
           </a:xfrm>
           <a:prstGeom prst="rect">
@@ -9422,7 +9410,7 @@
         </p:nvSpPr>
         <p:spPr>
           <a:xfrm>
-            <a:off x="611560" y="1700808"/>
+            <a:off x="2135560" y="1700808"/>
             <a:ext cx="8229600" cy="1152128"/>
           </a:xfrm>
         </p:spPr>
@@ -9544,7 +9532,7 @@
         </p:nvSpPr>
         <p:spPr>
           <a:xfrm>
-            <a:off x="4648200" y="1600201"/>
+            <a:off x="6172200" y="1600202"/>
             <a:ext cx="4038600" cy="4525963"/>
           </a:xfrm>
         </p:spPr>
@@ -9609,7 +9597,7 @@
         </p:nvSpPr>
         <p:spPr>
           <a:xfrm>
-            <a:off x="457200" y="1600201"/>
+            <a:off x="1981200" y="1600202"/>
             <a:ext cx="4038600" cy="4525963"/>
           </a:xfrm>
         </p:spPr>
@@ -9675,7 +9663,7 @@
         </p:blipFill>
         <p:spPr>
           <a:xfrm>
-            <a:off x="1732455" y="2636911"/>
+            <a:off x="3256456" y="2636912"/>
             <a:ext cx="1503591" cy="3410205"/>
           </a:xfrm>
           <a:prstGeom prst="rect">
@@ -9705,7 +9693,7 @@
         </p:blipFill>
         <p:spPr>
           <a:xfrm>
-            <a:off x="5890771" y="2638810"/>
+            <a:off x="7414771" y="2638810"/>
             <a:ext cx="1553458" cy="3487354"/>
           </a:xfrm>
           <a:prstGeom prst="rect">
@@ -9946,7 +9934,7 @@
         </p:nvSpPr>
         <p:spPr>
           <a:xfrm>
-            <a:off x="4648200" y="1600201"/>
+            <a:off x="6172200" y="1600202"/>
             <a:ext cx="4038600" cy="4525963"/>
           </a:xfrm>
         </p:spPr>
@@ -10001,7 +9989,7 @@
         </p:blipFill>
         <p:spPr>
           <a:xfrm>
-            <a:off x="6168543" y="2715959"/>
+            <a:off x="7692543" y="2715960"/>
             <a:ext cx="1565594" cy="3410205"/>
           </a:xfrm>
           <a:prstGeom prst="rect">
@@ -10027,7 +10015,7 @@
         </p:nvSpPr>
         <p:spPr>
           <a:xfrm>
-            <a:off x="457200" y="1600201"/>
+            <a:off x="1981200" y="1600202"/>
             <a:ext cx="4038600" cy="4525963"/>
           </a:xfrm>
         </p:spPr>
@@ -10077,7 +10065,7 @@
         </p:blipFill>
         <p:spPr>
           <a:xfrm>
-            <a:off x="1732455" y="2636911"/>
+            <a:off x="3256456" y="2636912"/>
             <a:ext cx="1503591" cy="3410205"/>
           </a:xfrm>
           <a:prstGeom prst="rect">
@@ -10407,7 +10395,7 @@
         </p:blipFill>
         <p:spPr>
           <a:xfrm>
-            <a:off x="1715643" y="2636912"/>
+            <a:off x="3239643" y="2636913"/>
             <a:ext cx="1521714" cy="3416095"/>
           </a:xfrm>
           <a:prstGeom prst="rect">
@@ -10437,7 +10425,7 @@
         </p:blipFill>
         <p:spPr>
           <a:xfrm>
-            <a:off x="5876951" y="2636912"/>
+            <a:off x="7400952" y="2636913"/>
             <a:ext cx="1581097" cy="3410207"/>
           </a:xfrm>
           <a:prstGeom prst="rect">
@@ -10681,7 +10669,7 @@
         </p:nvSpPr>
         <p:spPr>
           <a:xfrm>
-            <a:off x="3576718" y="1988840"/>
+            <a:off x="5100718" y="1988840"/>
             <a:ext cx="1620180" cy="3024336"/>
           </a:xfrm>
           <a:prstGeom prst="roundRect">
@@ -10789,7 +10777,7 @@
         </p:nvSpPr>
         <p:spPr>
           <a:xfrm>
-            <a:off x="5940152" y="1988840"/>
+            <a:off x="7464152" y="1988840"/>
             <a:ext cx="1620180" cy="3024336"/>
           </a:xfrm>
           <a:prstGeom prst="roundRect">
@@ -10894,7 +10882,7 @@
         </p:nvSpPr>
         <p:spPr>
           <a:xfrm>
-            <a:off x="1213284" y="1988840"/>
+            <a:off x="2737284" y="1988840"/>
             <a:ext cx="1620180" cy="3024336"/>
           </a:xfrm>
           <a:prstGeom prst="roundRect">
@@ -11011,7 +10999,7 @@
         </p:blipFill>
         <p:spPr>
           <a:xfrm>
-            <a:off x="1723294" y="2132856"/>
+            <a:off x="3247295" y="2132857"/>
             <a:ext cx="600159" cy="619211"/>
           </a:xfrm>
           <a:prstGeom prst="rect">
@@ -11041,7 +11029,7 @@
         </p:blipFill>
         <p:spPr>
           <a:xfrm>
-            <a:off x="4062913" y="2066171"/>
+            <a:off x="5586913" y="2066171"/>
             <a:ext cx="647790" cy="752580"/>
           </a:xfrm>
           <a:prstGeom prst="rect">
@@ -11071,7 +11059,7 @@
         </p:blipFill>
         <p:spPr>
           <a:xfrm>
-            <a:off x="6450163" y="2085224"/>
+            <a:off x="7974164" y="2085225"/>
             <a:ext cx="600159" cy="733527"/>
           </a:xfrm>
           <a:prstGeom prst="rect">
@@ -11244,7 +11232,7 @@
         </p:blipFill>
         <p:spPr>
           <a:xfrm>
-            <a:off x="1685952" y="2636912"/>
+            <a:off x="3209952" y="2636913"/>
             <a:ext cx="1581096" cy="3410205"/>
           </a:xfrm>
           <a:prstGeom prst="rect">
@@ -11274,7 +11262,7 @@
         </p:blipFill>
         <p:spPr>
           <a:xfrm>
-            <a:off x="5923455" y="2636911"/>
+            <a:off x="7447455" y="2636912"/>
             <a:ext cx="1488090" cy="3410205"/>
           </a:xfrm>
           <a:prstGeom prst="rect">
@@ -11570,7 +11558,7 @@
         </p:blipFill>
         <p:spPr>
           <a:xfrm>
-            <a:off x="1644843" y="2773205"/>
+            <a:off x="3168843" y="2773205"/>
             <a:ext cx="1581096" cy="3137616"/>
           </a:xfrm>
           <a:prstGeom prst="rect">
@@ -12754,7 +12742,7 @@
         </p:nvSpPr>
         <p:spPr>
           <a:xfrm>
-            <a:off x="1418752" y="2522337"/>
+            <a:off x="2942753" y="2522338"/>
             <a:ext cx="1144067" cy="374801"/>
           </a:xfrm>
           <a:prstGeom prst="roundRect">
@@ -12815,7 +12803,7 @@
         </p:nvSpPr>
         <p:spPr>
           <a:xfrm>
-            <a:off x="2703831" y="2522337"/>
+            <a:off x="4227832" y="2522338"/>
             <a:ext cx="1144067" cy="374801"/>
           </a:xfrm>
           <a:prstGeom prst="roundRect">
@@ -12876,7 +12864,7 @@
         </p:nvSpPr>
         <p:spPr>
           <a:xfrm>
-            <a:off x="3988909" y="2522337"/>
+            <a:off x="5512910" y="2522338"/>
             <a:ext cx="1144067" cy="374801"/>
           </a:xfrm>
           <a:prstGeom prst="roundRect">
@@ -12931,7 +12919,7 @@
         </p:nvSpPr>
         <p:spPr>
           <a:xfrm>
-            <a:off x="5273988" y="2522337"/>
+            <a:off x="6797989" y="2522338"/>
             <a:ext cx="1144067" cy="374801"/>
           </a:xfrm>
           <a:prstGeom prst="roundRect">
@@ -12992,7 +12980,7 @@
         </p:nvSpPr>
         <p:spPr>
           <a:xfrm>
-            <a:off x="6559066" y="2522337"/>
+            <a:off x="8083067" y="2522338"/>
             <a:ext cx="1144067" cy="374801"/>
           </a:xfrm>
           <a:prstGeom prst="roundRect">
@@ -13047,7 +13035,7 @@
         </p:nvSpPr>
         <p:spPr>
           <a:xfrm>
-            <a:off x="1418752" y="3043987"/>
+            <a:off x="2942753" y="3043988"/>
             <a:ext cx="1144067" cy="374801"/>
           </a:xfrm>
           <a:prstGeom prst="roundRect">
@@ -13102,7 +13090,7 @@
         </p:nvSpPr>
         <p:spPr>
           <a:xfrm>
-            <a:off x="2703831" y="3043987"/>
+            <a:off x="4227832" y="3043988"/>
             <a:ext cx="1144067" cy="374801"/>
           </a:xfrm>
           <a:prstGeom prst="roundRect">
@@ -13157,7 +13145,7 @@
         </p:nvSpPr>
         <p:spPr>
           <a:xfrm>
-            <a:off x="3988909" y="3043987"/>
+            <a:off x="5512910" y="3043988"/>
             <a:ext cx="1144067" cy="374801"/>
           </a:xfrm>
           <a:prstGeom prst="roundRect">
@@ -13212,7 +13200,7 @@
         </p:nvSpPr>
         <p:spPr>
           <a:xfrm>
-            <a:off x="1418752" y="3565637"/>
+            <a:off x="2942753" y="3565638"/>
             <a:ext cx="1144067" cy="374801"/>
           </a:xfrm>
           <a:prstGeom prst="roundRect">
@@ -13273,7 +13261,7 @@
         </p:nvSpPr>
         <p:spPr>
           <a:xfrm>
-            <a:off x="2703831" y="3565637"/>
+            <a:off x="4227832" y="3565638"/>
             <a:ext cx="1144067" cy="374801"/>
           </a:xfrm>
           <a:prstGeom prst="roundRect">
@@ -13328,7 +13316,7 @@
         </p:nvSpPr>
         <p:spPr>
           <a:xfrm>
-            <a:off x="3988909" y="3565637"/>
+            <a:off x="5512910" y="3565638"/>
             <a:ext cx="1144067" cy="374801"/>
           </a:xfrm>
           <a:prstGeom prst="roundRect">
@@ -13389,7 +13377,7 @@
         </p:nvSpPr>
         <p:spPr>
           <a:xfrm>
-            <a:off x="5273988" y="3565637"/>
+            <a:off x="6797989" y="3565638"/>
             <a:ext cx="1144067" cy="374801"/>
           </a:xfrm>
           <a:prstGeom prst="roundRect">
@@ -13450,7 +13438,7 @@
         </p:nvSpPr>
         <p:spPr>
           <a:xfrm>
-            <a:off x="6559065" y="3043986"/>
+            <a:off x="8083066" y="3043987"/>
             <a:ext cx="1144067" cy="374801"/>
           </a:xfrm>
           <a:prstGeom prst="roundRect">
@@ -13505,7 +13493,7 @@
         </p:nvSpPr>
         <p:spPr>
           <a:xfrm>
-            <a:off x="6559065" y="3565635"/>
+            <a:off x="8083066" y="3565636"/>
             <a:ext cx="1144067" cy="374801"/>
           </a:xfrm>
           <a:prstGeom prst="roundRect">
@@ -13560,7 +13548,7 @@
         </p:nvSpPr>
         <p:spPr>
           <a:xfrm>
-            <a:off x="1416540" y="4087286"/>
+            <a:off x="2940541" y="4087287"/>
             <a:ext cx="1144067" cy="374801"/>
           </a:xfrm>
           <a:prstGeom prst="roundRect">
@@ -13621,7 +13609,7 @@
         </p:nvSpPr>
         <p:spPr>
           <a:xfrm>
-            <a:off x="2701618" y="4087285"/>
+            <a:off x="4225619" y="4087286"/>
             <a:ext cx="1144067" cy="374801"/>
           </a:xfrm>
           <a:prstGeom prst="roundRect">
@@ -13682,7 +13670,7 @@
         </p:nvSpPr>
         <p:spPr>
           <a:xfrm>
-            <a:off x="3986695" y="4087285"/>
+            <a:off x="5510696" y="4087286"/>
             <a:ext cx="1144067" cy="374801"/>
           </a:xfrm>
           <a:prstGeom prst="roundRect">
@@ -13743,7 +13731,7 @@
         </p:nvSpPr>
         <p:spPr>
           <a:xfrm>
-            <a:off x="6559066" y="4091587"/>
+            <a:off x="8083067" y="4091588"/>
             <a:ext cx="1144067" cy="374801"/>
           </a:xfrm>
           <a:prstGeom prst="roundRect">
@@ -13804,7 +13792,7 @@
         </p:nvSpPr>
         <p:spPr>
           <a:xfrm>
-            <a:off x="1418752" y="4608937"/>
+            <a:off x="2942753" y="4608938"/>
             <a:ext cx="1144067" cy="374801"/>
           </a:xfrm>
           <a:prstGeom prst="roundRect">
@@ -13865,7 +13853,7 @@
         </p:nvSpPr>
         <p:spPr>
           <a:xfrm>
-            <a:off x="2703831" y="4608937"/>
+            <a:off x="4227832" y="4608938"/>
             <a:ext cx="1144067" cy="374801"/>
           </a:xfrm>
           <a:prstGeom prst="roundRect">
@@ -13926,7 +13914,7 @@
         </p:nvSpPr>
         <p:spPr>
           <a:xfrm>
-            <a:off x="5271773" y="4087284"/>
+            <a:off x="6795774" y="4087285"/>
             <a:ext cx="1144067" cy="374801"/>
           </a:xfrm>
           <a:prstGeom prst="roundRect">
@@ -13987,7 +13975,7 @@
         </p:nvSpPr>
         <p:spPr>
           <a:xfrm>
-            <a:off x="3986695" y="4608937"/>
+            <a:off x="5510696" y="4608938"/>
             <a:ext cx="1144067" cy="374801"/>
           </a:xfrm>
           <a:prstGeom prst="roundRect">
@@ -14072,7 +14060,7 @@
         </p:nvSpPr>
         <p:spPr>
           <a:xfrm>
-            <a:off x="5273988" y="3043987"/>
+            <a:off x="6797989" y="3043988"/>
             <a:ext cx="1144067" cy="374801"/>
           </a:xfrm>
           <a:prstGeom prst="roundRect">
@@ -14139,7 +14127,7 @@
         </p:nvSpPr>
         <p:spPr>
           <a:xfrm>
-            <a:off x="5269558" y="4608931"/>
+            <a:off x="6793559" y="4608932"/>
             <a:ext cx="1144067" cy="374801"/>
           </a:xfrm>
           <a:prstGeom prst="roundRect">
@@ -14206,7 +14194,7 @@
         </p:nvSpPr>
         <p:spPr>
           <a:xfrm>
-            <a:off x="6559064" y="4617540"/>
+            <a:off x="8083065" y="4617541"/>
             <a:ext cx="1144067" cy="374801"/>
           </a:xfrm>
           <a:prstGeom prst="roundRect">
@@ -14337,7 +14325,7 @@
           </p:nvPr>
         </p:nvPicPr>
         <p:blipFill>
-          <a:blip r:embed="rId2">
+          <a:blip r:embed="rId2" cstate="print">
             <a:extLst>
               <a:ext uri="{28A0092B-C50C-407E-A947-70E740481C1C}">
                 <a14:useLocalDpi xmlns:a14="http://schemas.microsoft.com/office/drawing/2010/main" val="0"/>
@@ -14351,7 +14339,7 @@
         </p:blipFill>
         <p:spPr bwMode="auto">
           <a:xfrm>
-            <a:off x="1294030" y="2178559"/>
+            <a:off x="2818030" y="2178560"/>
             <a:ext cx="1828800" cy="1710047"/>
           </a:xfrm>
           <a:prstGeom prst="rect">
@@ -14384,7 +14372,7 @@
           <p:nvPr/>
         </p:nvPicPr>
         <p:blipFill>
-          <a:blip r:embed="rId3">
+          <a:blip r:embed="rId3" cstate="print">
             <a:extLst>
               <a:ext uri="{28A0092B-C50C-407E-A947-70E740481C1C}">
                 <a14:useLocalDpi xmlns:a14="http://schemas.microsoft.com/office/drawing/2010/main" val="0"/>
@@ -14398,7 +14386,7 @@
         </p:blipFill>
         <p:spPr bwMode="auto">
           <a:xfrm>
-            <a:off x="3657600" y="2178558"/>
+            <a:off x="5181600" y="2178559"/>
             <a:ext cx="1828800" cy="1710047"/>
           </a:xfrm>
           <a:prstGeom prst="rect">
@@ -14431,7 +14419,7 @@
           <p:nvPr/>
         </p:nvPicPr>
         <p:blipFill>
-          <a:blip r:embed="rId4">
+          <a:blip r:embed="rId4" cstate="print">
             <a:extLst>
               <a:ext uri="{28A0092B-C50C-407E-A947-70E740481C1C}">
                 <a14:useLocalDpi xmlns:a14="http://schemas.microsoft.com/office/drawing/2010/main" val="0"/>
@@ -14445,7 +14433,7 @@
         </p:blipFill>
         <p:spPr bwMode="auto">
           <a:xfrm>
-            <a:off x="6021171" y="2180776"/>
+            <a:off x="7545172" y="2180776"/>
             <a:ext cx="1828801" cy="1707830"/>
           </a:xfrm>
           <a:prstGeom prst="rect">
@@ -14478,7 +14466,7 @@
           <p:nvPr/>
         </p:nvPicPr>
         <p:blipFill>
-          <a:blip r:embed="rId5">
+          <a:blip r:embed="rId5" cstate="print">
             <a:extLst>
               <a:ext uri="{28A0092B-C50C-407E-A947-70E740481C1C}">
                 <a14:useLocalDpi xmlns:a14="http://schemas.microsoft.com/office/drawing/2010/main" val="0"/>
@@ -14492,7 +14480,7 @@
         </p:blipFill>
         <p:spPr bwMode="auto">
           <a:xfrm>
-            <a:off x="1272258" y="4089991"/>
+            <a:off x="2796259" y="4089992"/>
             <a:ext cx="1921367" cy="1798939"/>
           </a:xfrm>
           <a:prstGeom prst="rect">
@@ -14525,7 +14513,7 @@
           <p:nvPr/>
         </p:nvPicPr>
         <p:blipFill>
-          <a:blip r:embed="rId6">
+          <a:blip r:embed="rId6" cstate="print">
             <a:extLst>
               <a:ext uri="{28A0092B-C50C-407E-A947-70E740481C1C}">
                 <a14:useLocalDpi xmlns:a14="http://schemas.microsoft.com/office/drawing/2010/main" val="0"/>
@@ -14539,7 +14527,7 @@
         </p:blipFill>
         <p:spPr bwMode="auto">
           <a:xfrm>
-            <a:off x="3668024" y="4146373"/>
+            <a:off x="5192024" y="4146374"/>
             <a:ext cx="1807952" cy="1686173"/>
           </a:xfrm>
           <a:prstGeom prst="rect">
@@ -14572,7 +14560,7 @@
           <p:nvPr/>
         </p:nvPicPr>
         <p:blipFill>
-          <a:blip r:embed="rId7">
+          <a:blip r:embed="rId7" cstate="print">
             <a:extLst>
               <a:ext uri="{28A0092B-C50C-407E-A947-70E740481C1C}">
                 <a14:useLocalDpi xmlns:a14="http://schemas.microsoft.com/office/drawing/2010/main" val="0"/>
@@ -14586,7 +14574,7 @@
         </p:blipFill>
         <p:spPr bwMode="auto">
           <a:xfrm>
-            <a:off x="6029838" y="4149637"/>
+            <a:off x="7553839" y="4149638"/>
             <a:ext cx="1811465" cy="1682909"/>
           </a:xfrm>
           <a:prstGeom prst="rect">
@@ -14945,7 +14933,7 @@
         </p:blipFill>
         <p:spPr bwMode="auto">
           <a:xfrm>
-            <a:off x="1295320" y="2178559"/>
+            <a:off x="2819321" y="2178560"/>
             <a:ext cx="1826219" cy="1710047"/>
           </a:xfrm>
           <a:prstGeom prst="rect">
@@ -14984,7 +14972,7 @@
         </p:blipFill>
         <p:spPr bwMode="auto">
           <a:xfrm>
-            <a:off x="3661366" y="2178558"/>
+            <a:off x="5185367" y="2178559"/>
             <a:ext cx="1821269" cy="1710047"/>
           </a:xfrm>
           <a:prstGeom prst="rect">
@@ -15023,7 +15011,7 @@
         </p:blipFill>
         <p:spPr bwMode="auto">
           <a:xfrm>
-            <a:off x="6024729" y="2180776"/>
+            <a:off x="7548730" y="2180776"/>
             <a:ext cx="1821685" cy="1707830"/>
           </a:xfrm>
           <a:prstGeom prst="rect">
@@ -15062,7 +15050,7 @@
         </p:blipFill>
         <p:spPr bwMode="auto">
           <a:xfrm>
-            <a:off x="1272258" y="4109445"/>
+            <a:off x="2796259" y="4109445"/>
             <a:ext cx="1921367" cy="1760030"/>
           </a:xfrm>
           <a:prstGeom prst="rect">
@@ -15101,7 +15089,7 @@
         </p:blipFill>
         <p:spPr bwMode="auto">
           <a:xfrm>
-            <a:off x="3668024" y="4160815"/>
+            <a:off x="5192024" y="4160816"/>
             <a:ext cx="1807952" cy="1657289"/>
           </a:xfrm>
           <a:prstGeom prst="rect">
@@ -15427,7 +15415,7 @@
         </p:blipFill>
         <p:spPr bwMode="auto">
           <a:xfrm>
-            <a:off x="1294030" y="2180904"/>
+            <a:off x="2818030" y="2180904"/>
             <a:ext cx="1828800" cy="1705356"/>
           </a:xfrm>
           <a:prstGeom prst="rect">
@@ -15466,7 +15454,7 @@
         </p:blipFill>
         <p:spPr bwMode="auto">
           <a:xfrm>
-            <a:off x="3657600" y="2178617"/>
+            <a:off x="5181600" y="2178617"/>
             <a:ext cx="1828800" cy="1709928"/>
           </a:xfrm>
           <a:prstGeom prst="rect">
@@ -15505,7 +15493,7 @@
         </p:blipFill>
         <p:spPr bwMode="auto">
           <a:xfrm>
-            <a:off x="6022294" y="2180776"/>
+            <a:off x="7546295" y="2180776"/>
             <a:ext cx="1826555" cy="1707830"/>
           </a:xfrm>
           <a:prstGeom prst="rect">
@@ -15544,7 +15532,7 @@
         </p:blipFill>
         <p:spPr bwMode="auto">
           <a:xfrm>
-            <a:off x="1272258" y="4095109"/>
+            <a:off x="2796259" y="4095110"/>
             <a:ext cx="1921367" cy="1788701"/>
           </a:xfrm>
           <a:prstGeom prst="rect">
@@ -15583,7 +15571,7 @@
         </p:blipFill>
         <p:spPr bwMode="auto">
           <a:xfrm>
-            <a:off x="3668024" y="4156249"/>
+            <a:off x="5192024" y="4156249"/>
             <a:ext cx="1807952" cy="1666420"/>
           </a:xfrm>
           <a:prstGeom prst="rect">
@@ -15622,7 +15610,7 @@
         </p:blipFill>
         <p:spPr bwMode="auto">
           <a:xfrm>
-            <a:off x="6029838" y="4151803"/>
+            <a:off x="7553839" y="4151804"/>
             <a:ext cx="1811465" cy="1678577"/>
           </a:xfrm>
           <a:prstGeom prst="rect">
@@ -15985,7 +15973,7 @@
         </p:blipFill>
         <p:spPr bwMode="auto">
           <a:xfrm>
-            <a:off x="1298538" y="2178559"/>
+            <a:off x="2822538" y="2178560"/>
             <a:ext cx="1819782" cy="1710047"/>
           </a:xfrm>
           <a:prstGeom prst="rect">
@@ -16024,7 +16012,7 @@
         </p:blipFill>
         <p:spPr bwMode="auto">
           <a:xfrm>
-            <a:off x="3661366" y="2182138"/>
+            <a:off x="5185367" y="2182139"/>
             <a:ext cx="1821269" cy="1702887"/>
           </a:xfrm>
           <a:prstGeom prst="rect">
@@ -16185,7 +16173,7 @@
         </p:nvSpPr>
         <p:spPr>
           <a:xfrm>
-            <a:off x="4141600" y="1600201"/>
+            <a:off x="5665600" y="1600202"/>
             <a:ext cx="4545200" cy="4525963"/>
           </a:xfrm>
         </p:spPr>
@@ -16271,7 +16259,7 @@
         </p:nvSpPr>
         <p:spPr>
           <a:xfrm>
-            <a:off x="749939" y="4733154"/>
+            <a:off x="2273940" y="4733155"/>
             <a:ext cx="3377351" cy="386581"/>
           </a:xfrm>
           <a:prstGeom prst="rect">
@@ -16414,7 +16402,7 @@
         </p:nvGrpSpPr>
         <p:grpSpPr>
           <a:xfrm>
-            <a:off x="749939" y="2718322"/>
+            <a:off x="2273940" y="2718322"/>
             <a:ext cx="3377351" cy="1902410"/>
             <a:chOff x="2819400" y="2021408"/>
             <a:chExt cx="5994400" cy="3325292"/>
@@ -16800,7 +16788,7 @@
         </p:nvGrpSpPr>
         <p:grpSpPr>
           <a:xfrm>
-            <a:off x="1008480" y="2209510"/>
+            <a:off x="2532480" y="2209510"/>
             <a:ext cx="2791990" cy="461842"/>
             <a:chOff x="1371601" y="1838670"/>
             <a:chExt cx="3797300" cy="628137"/>
@@ -17133,7 +17121,7 @@
         </p:nvSpPr>
         <p:spPr>
           <a:xfrm>
-            <a:off x="757096" y="3495807"/>
+            <a:off x="2281096" y="3495808"/>
             <a:ext cx="3370194" cy="511491"/>
           </a:xfrm>
           <a:prstGeom prst="rect">
@@ -17437,7 +17425,7 @@
         </p:blipFill>
         <p:spPr bwMode="auto">
           <a:xfrm>
-            <a:off x="1298538" y="2180153"/>
+            <a:off x="2822538" y="2180153"/>
             <a:ext cx="1819782" cy="1706860"/>
           </a:xfrm>
           <a:prstGeom prst="rect">
@@ -17476,7 +17464,7 @@
         </p:blipFill>
         <p:spPr bwMode="auto">
           <a:xfrm>
-            <a:off x="3661366" y="2185035"/>
+            <a:off x="5185367" y="2185035"/>
             <a:ext cx="1821269" cy="1697092"/>
           </a:xfrm>
           <a:prstGeom prst="rect">
@@ -17655,7 +17643,7 @@
         </p:blipFill>
         <p:spPr bwMode="auto">
           <a:xfrm>
-            <a:off x="1296475" y="2180904"/>
+            <a:off x="2820476" y="2180904"/>
             <a:ext cx="1823909" cy="1705356"/>
           </a:xfrm>
           <a:prstGeom prst="rect">
@@ -17694,7 +17682,7 @@
         </p:blipFill>
         <p:spPr bwMode="auto">
           <a:xfrm>
-            <a:off x="3657600" y="2180903"/>
+            <a:off x="5181600" y="2180903"/>
             <a:ext cx="1828800" cy="1705356"/>
           </a:xfrm>
           <a:prstGeom prst="rect">
@@ -17733,7 +17721,7 @@
         </p:blipFill>
         <p:spPr bwMode="auto">
           <a:xfrm>
-            <a:off x="6022294" y="2180776"/>
+            <a:off x="7546295" y="2180776"/>
             <a:ext cx="1826555" cy="1707830"/>
           </a:xfrm>
           <a:prstGeom prst="rect">
@@ -17772,7 +17760,7 @@
         </p:blipFill>
         <p:spPr bwMode="auto">
           <a:xfrm>
-            <a:off x="1277147" y="4095109"/>
+            <a:off x="2801147" y="4095110"/>
             <a:ext cx="1911588" cy="1788701"/>
           </a:xfrm>
           <a:prstGeom prst="rect">
@@ -17811,7 +17799,7 @@
         </p:blipFill>
         <p:spPr bwMode="auto">
           <a:xfrm>
-            <a:off x="3668024" y="4158217"/>
+            <a:off x="5192024" y="4158217"/>
             <a:ext cx="1807952" cy="1662484"/>
           </a:xfrm>
           <a:prstGeom prst="rect">
@@ -17850,7 +17838,7 @@
         </p:blipFill>
         <p:spPr bwMode="auto">
           <a:xfrm>
-            <a:off x="6029838" y="4161413"/>
+            <a:off x="7553839" y="4161413"/>
             <a:ext cx="1811465" cy="1659356"/>
           </a:xfrm>
           <a:prstGeom prst="rect">
@@ -18168,7 +18156,7 @@
         </p:nvSpPr>
         <p:spPr>
           <a:xfrm>
-            <a:off x="402432" y="1073944"/>
+            <a:off x="1926433" y="1073945"/>
             <a:ext cx="8741569" cy="675085"/>
           </a:xfrm>
         </p:spPr>
@@ -18198,7 +18186,7 @@
         </p:nvGrpSpPr>
         <p:grpSpPr>
           <a:xfrm>
-            <a:off x="286840" y="2637269"/>
+            <a:off x="1810841" y="2637270"/>
             <a:ext cx="8572061" cy="2487151"/>
             <a:chOff x="388937" y="2881511"/>
             <a:chExt cx="11658598" cy="3382699"/>
@@ -18950,7 +18938,7 @@
         </p:blipFill>
         <p:spPr bwMode="auto">
           <a:xfrm>
-            <a:off x="1296475" y="2187744"/>
+            <a:off x="2820476" y="2187744"/>
             <a:ext cx="1823909" cy="1691676"/>
           </a:xfrm>
           <a:prstGeom prst="rect">
@@ -18989,7 +18977,7 @@
         </p:blipFill>
         <p:spPr bwMode="auto">
           <a:xfrm>
-            <a:off x="3662173" y="2180903"/>
+            <a:off x="5186174" y="2180903"/>
             <a:ext cx="1819655" cy="1705356"/>
           </a:xfrm>
           <a:prstGeom prst="rect">
@@ -19028,7 +19016,7 @@
         </p:blipFill>
         <p:spPr bwMode="auto">
           <a:xfrm>
-            <a:off x="6026861" y="2180776"/>
+            <a:off x="7550861" y="2180776"/>
             <a:ext cx="1817422" cy="1707830"/>
           </a:xfrm>
           <a:prstGeom prst="rect">
@@ -19067,7 +19055,7 @@
         </p:blipFill>
         <p:spPr bwMode="auto">
           <a:xfrm>
-            <a:off x="1277147" y="4099661"/>
+            <a:off x="2801147" y="4099662"/>
             <a:ext cx="1911588" cy="1779597"/>
           </a:xfrm>
           <a:prstGeom prst="rect">
@@ -19322,7 +19310,7 @@
         </p:blipFill>
         <p:spPr>
           <a:xfrm>
-            <a:off x="5166066" y="2140415"/>
+            <a:off x="6690066" y="2140415"/>
             <a:ext cx="1728192" cy="3497532"/>
           </a:xfrm>
           <a:prstGeom prst="rect">
@@ -19341,7 +19329,7 @@
           </p:nvPr>
         </p:nvPicPr>
         <p:blipFill>
-          <a:blip r:embed="rId3">
+          <a:blip r:embed="rId3" cstate="print">
             <a:extLst>
               <a:ext uri="{28A0092B-C50C-407E-A947-70E740481C1C}">
                 <a14:useLocalDpi xmlns:a14="http://schemas.microsoft.com/office/drawing/2010/main" val="0"/>
@@ -19354,7 +19342,7 @@
         </p:blipFill>
         <p:spPr>
           <a:xfrm>
-            <a:off x="2303749" y="2140415"/>
+            <a:off x="3827750" y="2140415"/>
             <a:ext cx="1734347" cy="3497532"/>
           </a:xfrm>
         </p:spPr>
@@ -19565,7 +19553,7 @@
         </p:blipFill>
         <p:spPr bwMode="auto">
           <a:xfrm>
-            <a:off x="1300234" y="2180153"/>
+            <a:off x="2824234" y="2180153"/>
             <a:ext cx="1816390" cy="1706860"/>
           </a:xfrm>
           <a:prstGeom prst="rect">
@@ -19604,7 +19592,7 @@
         </p:blipFill>
         <p:spPr bwMode="auto">
           <a:xfrm>
-            <a:off x="3661366" y="2193521"/>
+            <a:off x="5185367" y="2193522"/>
             <a:ext cx="1821269" cy="1680121"/>
           </a:xfrm>
           <a:prstGeom prst="rect">
@@ -20435,7 +20423,7 @@
         </p:nvSpPr>
         <p:spPr>
           <a:xfrm>
-            <a:off x="457200" y="4077072"/>
+            <a:off x="1981200" y="4077072"/>
             <a:ext cx="6400800" cy="1754326"/>
           </a:xfrm>
           <a:prstGeom prst="rect">
@@ -22403,7 +22391,7 @@
         <p:spPr/>
         <p:txBody>
           <a:bodyPr>
-            <a:normAutofit fontScale="92500"/>
+            <a:normAutofit lnSpcReduction="10000"/>
           </a:bodyPr>
           <a:lstStyle/>
           <a:p>
@@ -24731,7 +24719,7 @@
         <p:spPr/>
         <p:txBody>
           <a:bodyPr>
-            <a:normAutofit fontScale="85000" lnSpcReduction="20000"/>
+            <a:normAutofit fontScale="92500" lnSpcReduction="20000"/>
           </a:bodyPr>
           <a:lstStyle/>
           <a:p>
@@ -26225,7 +26213,7 @@
         </p:nvSpPr>
         <p:spPr bwMode="auto">
           <a:xfrm>
-            <a:off x="152400" y="242500"/>
+            <a:off x="1676400" y="242501"/>
             <a:ext cx="269626" cy="276999"/>
           </a:xfrm>
           <a:prstGeom prst="rect">
@@ -26269,43 +26257,24 @@
           </a:bodyPr>
           <a:lstStyle/>
           <a:p>
-            <a:pPr marL="0" marR="0" lvl="0" indent="0" algn="l" defTabSz="914400" rtl="0" eaLnBrk="0" fontAlgn="base" latinLnBrk="0" hangingPunct="0">
-              <a:lnSpc>
-                <a:spcPct val="100000"/>
-              </a:lnSpc>
+            <a:pPr eaLnBrk="0" fontAlgn="base" hangingPunct="0">
               <a:spcBef>
                 <a:spcPct val="0"/>
               </a:spcBef>
               <a:spcAft>
                 <a:spcPct val="0"/>
               </a:spcAft>
-              <a:buClrTx/>
-              <a:buSzTx/>
-              <a:buFontTx/>
-              <a:buNone/>
-              <a:tabLst/>
             </a:pPr>
             <a:r>
-              <a:rPr kumimoji="0" lang="cs-CZ" altLang="cs-CZ" sz="1200" b="0" i="0" u="none" strike="noStrike" cap="none" normalizeH="0" baseline="0" dirty="0">
-                <a:ln>
-                  <a:noFill/>
-                </a:ln>
+              <a:rPr lang="cs-CZ" altLang="cs-CZ" sz="1200" dirty="0">
                 <a:solidFill>
                   <a:srgbClr val="000000"/>
                 </a:solidFill>
-                <a:effectLst/>
                 <a:latin typeface="Consolas" panose="020B0609020204030204" pitchFamily="49" charset="0"/>
               </a:rPr>
               <a:t> </a:t>
             </a:r>
-            <a:endParaRPr kumimoji="0" lang="cs-CZ" altLang="cs-CZ" sz="1800" b="0" i="0" u="none" strike="noStrike" cap="none" normalizeH="0" baseline="0" dirty="0">
-              <a:ln>
-                <a:noFill/>
-              </a:ln>
-              <a:solidFill>
-                <a:schemeClr val="tx1"/>
-              </a:solidFill>
-              <a:effectLst/>
+            <a:endParaRPr lang="cs-CZ" altLang="cs-CZ" dirty="0">
               <a:latin typeface="Arial" panose="020B0604020202020204" pitchFamily="34" charset="0"/>
             </a:endParaRPr>
           </a:p>
@@ -26321,7 +26290,7 @@
         </p:nvSpPr>
         <p:spPr bwMode="auto">
           <a:xfrm>
-            <a:off x="0" y="90100"/>
+            <a:off x="1524000" y="90101"/>
             <a:ext cx="269626" cy="276999"/>
           </a:xfrm>
           <a:prstGeom prst="rect">
@@ -26365,43 +26334,24 @@
           </a:bodyPr>
           <a:lstStyle/>
           <a:p>
-            <a:pPr marL="0" marR="0" lvl="0" indent="0" algn="l" defTabSz="914400" rtl="0" eaLnBrk="0" fontAlgn="base" latinLnBrk="0" hangingPunct="0">
-              <a:lnSpc>
-                <a:spcPct val="100000"/>
-              </a:lnSpc>
+            <a:pPr eaLnBrk="0" fontAlgn="base" hangingPunct="0">
               <a:spcBef>
                 <a:spcPct val="0"/>
               </a:spcBef>
               <a:spcAft>
                 <a:spcPct val="0"/>
               </a:spcAft>
-              <a:buClrTx/>
-              <a:buSzTx/>
-              <a:buFontTx/>
-              <a:buNone/>
-              <a:tabLst/>
             </a:pPr>
             <a:r>
-              <a:rPr kumimoji="0" lang="cs-CZ" altLang="cs-CZ" sz="1200" b="0" i="0" u="none" strike="noStrike" cap="none" normalizeH="0" baseline="0" dirty="0">
-                <a:ln>
-                  <a:noFill/>
-                </a:ln>
+              <a:rPr lang="cs-CZ" altLang="cs-CZ" sz="1200" dirty="0">
                 <a:solidFill>
                   <a:srgbClr val="000000"/>
                 </a:solidFill>
-                <a:effectLst/>
                 <a:latin typeface="Consolas" panose="020B0609020204030204" pitchFamily="49" charset="0"/>
               </a:rPr>
               <a:t> </a:t>
             </a:r>
-            <a:endParaRPr kumimoji="0" lang="cs-CZ" altLang="cs-CZ" sz="1800" b="0" i="0" u="none" strike="noStrike" cap="none" normalizeH="0" baseline="0" dirty="0">
-              <a:ln>
-                <a:noFill/>
-              </a:ln>
-              <a:solidFill>
-                <a:schemeClr val="tx1"/>
-              </a:solidFill>
-              <a:effectLst/>
+            <a:endParaRPr lang="cs-CZ" altLang="cs-CZ" dirty="0">
               <a:latin typeface="Arial" panose="020B0604020202020204" pitchFamily="34" charset="0"/>
             </a:endParaRPr>
           </a:p>
@@ -26939,7 +26889,7 @@
         <p:spPr/>
         <p:txBody>
           <a:bodyPr>
-            <a:normAutofit fontScale="90000"/>
+            <a:normAutofit/>
           </a:bodyPr>
           <a:lstStyle/>
           <a:p>
@@ -27836,7 +27786,7 @@
         </p:blipFill>
         <p:spPr>
           <a:xfrm>
-            <a:off x="2253603" y="2443164"/>
+            <a:off x="3777604" y="2443164"/>
             <a:ext cx="841295" cy="1125298"/>
           </a:xfrm>
         </p:spPr>
@@ -27869,7 +27819,7 @@
         </p:blipFill>
         <p:spPr>
           <a:xfrm>
-            <a:off x="4107665" y="2443164"/>
+            <a:off x="5631665" y="2443164"/>
             <a:ext cx="991334" cy="1125298"/>
           </a:xfrm>
           <a:prstGeom prst="rect">
@@ -27905,7 +27855,7 @@
         </p:blipFill>
         <p:spPr>
           <a:xfrm>
-            <a:off x="3094898" y="2443164"/>
+            <a:off x="4618898" y="2443164"/>
             <a:ext cx="1012768" cy="1125298"/>
           </a:xfrm>
           <a:prstGeom prst="rect">
@@ -27941,7 +27891,7 @@
         </p:blipFill>
         <p:spPr>
           <a:xfrm>
-            <a:off x="5099000" y="2443164"/>
+            <a:off x="6623000" y="2443164"/>
             <a:ext cx="884162" cy="1125298"/>
           </a:xfrm>
           <a:prstGeom prst="rect">
@@ -27963,7 +27913,7 @@
         </p:nvSpPr>
         <p:spPr>
           <a:xfrm>
-            <a:off x="3377422" y="2201625"/>
+            <a:off x="4901423" y="2201625"/>
             <a:ext cx="1695079" cy="352084"/>
           </a:xfrm>
           <a:prstGeom prst="rect">
@@ -28007,7 +27957,7 @@
         </p:nvSpPr>
         <p:spPr>
           <a:xfrm>
-            <a:off x="6286500" y="4693256"/>
+            <a:off x="7810501" y="4693256"/>
             <a:ext cx="2496363" cy="222240"/>
           </a:xfrm>
           <a:prstGeom prst="rect">
@@ -28081,7 +28031,7 @@
         </p:blipFill>
         <p:spPr>
           <a:xfrm>
-            <a:off x="2239317" y="3654186"/>
+            <a:off x="3763318" y="3654186"/>
             <a:ext cx="1028843" cy="1237828"/>
           </a:xfrm>
           <a:prstGeom prst="rect">
@@ -28117,7 +28067,7 @@
         </p:blipFill>
         <p:spPr>
           <a:xfrm>
-            <a:off x="3244860" y="3654186"/>
+            <a:off x="4768861" y="3654186"/>
             <a:ext cx="921673" cy="1237828"/>
           </a:xfrm>
           <a:prstGeom prst="rect">
@@ -28153,7 +28103,7 @@
         </p:blipFill>
         <p:spPr>
           <a:xfrm>
-            <a:off x="4186100" y="3654186"/>
+            <a:off x="5710100" y="3654186"/>
             <a:ext cx="985976" cy="1237828"/>
           </a:xfrm>
           <a:prstGeom prst="rect">
@@ -28189,7 +28139,7 @@
         </p:blipFill>
         <p:spPr>
           <a:xfrm>
-            <a:off x="5172076" y="3654186"/>
+            <a:off x="6696077" y="3654186"/>
             <a:ext cx="889521" cy="1237828"/>
           </a:xfrm>
           <a:prstGeom prst="rect">
@@ -28211,7 +28161,7 @@
         </p:nvSpPr>
         <p:spPr>
           <a:xfrm>
-            <a:off x="3710928" y="3498373"/>
+            <a:off x="5234929" y="3498373"/>
             <a:ext cx="1030923" cy="352084"/>
           </a:xfrm>
           <a:prstGeom prst="rect">
@@ -28251,7 +28201,7 @@
         </p:nvSpPr>
         <p:spPr>
           <a:xfrm>
-            <a:off x="4880380" y="2184660"/>
+            <a:off x="6404380" y="2184660"/>
             <a:ext cx="292068" cy="352084"/>
           </a:xfrm>
           <a:prstGeom prst="rect">
@@ -29287,7 +29237,7 @@
         </p:nvSpPr>
         <p:spPr>
           <a:xfrm>
-            <a:off x="749939" y="4733154"/>
+            <a:off x="2273940" y="4733155"/>
             <a:ext cx="3377351" cy="386581"/>
           </a:xfrm>
         </p:spPr>
@@ -29333,7 +29283,7 @@
         </p:nvSpPr>
         <p:spPr>
           <a:xfrm>
-            <a:off x="4911661" y="4733154"/>
+            <a:off x="6435662" y="4733155"/>
             <a:ext cx="3370931" cy="386581"/>
           </a:xfrm>
         </p:spPr>
@@ -29371,7 +29321,7 @@
         </p:nvGrpSpPr>
         <p:grpSpPr>
           <a:xfrm>
-            <a:off x="749939" y="2718322"/>
+            <a:off x="2273940" y="2718322"/>
             <a:ext cx="3377351" cy="1902410"/>
             <a:chOff x="2819400" y="2021408"/>
             <a:chExt cx="5994400" cy="3325292"/>
@@ -29757,7 +29707,7 @@
         </p:nvGrpSpPr>
         <p:grpSpPr>
           <a:xfrm>
-            <a:off x="1008480" y="2209510"/>
+            <a:off x="2532480" y="2209510"/>
             <a:ext cx="2791990" cy="461842"/>
             <a:chOff x="1371601" y="1838670"/>
             <a:chExt cx="3797300" cy="628137"/>
@@ -30090,7 +30040,7 @@
         </p:nvGrpSpPr>
         <p:grpSpPr>
           <a:xfrm>
-            <a:off x="4905241" y="2209510"/>
+            <a:off x="6429241" y="2209510"/>
             <a:ext cx="3397550" cy="2401886"/>
             <a:chOff x="6671469" y="1838670"/>
             <a:chExt cx="4620904" cy="3266731"/>
@@ -30833,7 +30783,7 @@
         </p:nvSpPr>
         <p:spPr>
           <a:xfrm>
-            <a:off x="757096" y="3495807"/>
+            <a:off x="2281096" y="3495808"/>
             <a:ext cx="3370194" cy="511491"/>
           </a:xfrm>
           <a:prstGeom prst="rect">
@@ -31072,7 +31022,7 @@
         </p:nvSpPr>
         <p:spPr>
           <a:xfrm>
-            <a:off x="4160276" y="1600201"/>
+            <a:off x="5684277" y="1600202"/>
             <a:ext cx="4526523" cy="4525963"/>
           </a:xfrm>
         </p:spPr>
@@ -31207,7 +31157,7 @@
         </p:nvGrpSpPr>
         <p:grpSpPr>
           <a:xfrm>
-            <a:off x="768615" y="2396265"/>
+            <a:off x="2292616" y="2396265"/>
             <a:ext cx="3377351" cy="2401886"/>
             <a:chOff x="6671469" y="1838670"/>
             <a:chExt cx="4593431" cy="3266731"/>
@@ -32255,7 +32205,7 @@
         </p:nvSpPr>
         <p:spPr>
           <a:xfrm>
-            <a:off x="457200" y="1417639"/>
+            <a:off x="1981200" y="1417640"/>
             <a:ext cx="7643192" cy="4027585"/>
           </a:xfrm>
           <a:ln>
@@ -32733,7 +32683,7 @@
         </p:nvSpPr>
         <p:spPr>
           <a:xfrm>
-            <a:off x="4394582" y="2311680"/>
+            <a:off x="5918582" y="2311680"/>
             <a:ext cx="4158806" cy="2987500"/>
           </a:xfrm>
           <a:prstGeom prst="rect">
@@ -33204,7 +33154,7 @@
         </p:nvGrpSpPr>
         <p:grpSpPr>
           <a:xfrm>
-            <a:off x="768615" y="2396265"/>
+            <a:off x="2292616" y="2396265"/>
             <a:ext cx="3377351" cy="2401886"/>
             <a:chOff x="6671469" y="1838670"/>
             <a:chExt cx="4593431" cy="3266731"/>

</xml_diff>